<commit_message>
Complete Microsoft presales migration for CMMC and M365 solutions
- Migrate CMMC GCC High Enclave and M365 Enterprise Deployment to new presales format
- Create discovery questionnaires, infrastructure costs, and solution briefings
- Implement comprehensive Statement of Work documents following AWS IDP structure
- Fix Level of Effort CSV structure with proper 4-section format (Scope Assumptions, Estimate Settings, Level of Effort, Credits)
- Add contextual introductions to all tables for improved readability
- Generate all Office documents (XLSX, PPTX, DOCX) with zero validation errors
- Ensure all documents pass converter validation with no warnings
</commit_message>
<xml_diff>
--- a/solutions/microsoft/cyber-security/cmmc-enclave/presales/solution-briefing.pptx
+++ b/solutions/microsoft/cyber-security/cmmc-enclave/presales/solution-briefing.pptx
@@ -303,6 +303,75 @@
 </p:notesMaster>
 </file>
 
+<file path=ppt/notesSlides/notesSlide1.xml><?xml version="1.0" encoding="utf-8"?>
+<p:notes xmlns:a="http://schemas.openxmlformats.org/drawingml/2006/main" xmlns:p="http://schemas.openxmlformats.org/presentationml/2006/main" xmlns:r="http://schemas.openxmlformats.org/officeDocument/2006/relationships">
+  <p:cSld>
+    <p:spTree>
+      <p:nvGrpSpPr>
+        <p:cNvPr id="1" name=""/>
+        <p:cNvGrpSpPr/>
+        <p:nvPr/>
+      </p:nvGrpSpPr>
+      <p:grpSpPr>
+        <a:xfrm>
+          <a:off x="0" y="0"/>
+          <a:ext cx="0" cy="0"/>
+          <a:chOff x="0" y="0"/>
+          <a:chExt cx="0" cy="0"/>
+        </a:xfrm>
+      </p:grpSpPr>
+      <p:sp>
+        <p:nvSpPr>
+          <p:cNvPr id="2" name="Slide Image Placeholder 1"/>
+          <p:cNvSpPr>
+            <a:spLocks noGrp="1"/>
+          </p:cNvSpPr>
+          <p:nvPr>
+            <p:ph type="sldImg"/>
+          </p:nvPr>
+        </p:nvSpPr>
+        <p:spPr/>
+      </p:sp>
+      <p:sp>
+        <p:nvSpPr>
+          <p:cNvPr id="3" name="Notes Placeholder 2"/>
+          <p:cNvSpPr>
+            <a:spLocks noGrp="1"/>
+          </p:cNvSpPr>
+          <p:nvPr>
+            <p:ph type="body" idx="1"/>
+          </p:nvPr>
+        </p:nvSpPr>
+        <p:spPr/>
+        <p:txBody>
+          <a:bodyPr/>
+          <a:lstStyle/>
+          <a:p>
+            <a:r>
+              <a:t>Additional Scope Parameters (not displayed on slide):</a:t>
+            </a:r>
+          </a:p>
+          <a:p/>
+          <a:p>
+            <a:r>
+              <a:t>• Azure Gov Resources: 5 VMs 2TB storage VNet ExpressRoute</a:t>
+            </a:r>
+          </a:p>
+          <a:p>
+            <a:r>
+              <a:t>• Assessment Timeline: Month 6 C3PAO assessment</a:t>
+            </a:r>
+          </a:p>
+        </p:txBody>
+      </p:sp>
+    </p:spTree>
+  </p:cSld>
+  <p:clrMapOvr>
+    <a:masterClrMapping/>
+  </p:clrMapOvr>
+</p:notes>
+</file>
+
 <file path=ppt/slideLayouts/slideLayout1.xml><?xml version="1.0" encoding="utf-8"?>
 <p:sldLayout xmlns:a="http://schemas.openxmlformats.org/drawingml/2006/main" xmlns:r="http://schemas.openxmlformats.org/officeDocument/2006/relationships" xmlns:p="http://schemas.openxmlformats.org/presentationml/2006/main" preserve="1" userDrawn="1">
   <p:cSld name="EO Title Slide">
@@ -693,6 +762,39 @@
       </p:grpSpPr>
       <p:sp>
         <p:nvSpPr>
+          <p:cNvPr id="12" name="Picture Placeholder 13">
+            <a:extLst>
+              <a:ext uri="{FF2B5EF4-FFF2-40B4-BE49-F238E27FC236}">
+                <a16:creationId xmlns:a16="http://schemas.microsoft.com/office/drawing/2014/main" id="{2DB97592-C4D5-B315-7F11-AA14F6EE8A62}"/>
+              </a:ext>
+            </a:extLst>
+          </p:cNvPr>
+          <p:cNvSpPr>
+            <a:spLocks noGrp="1"/>
+          </p:cNvSpPr>
+          <p:nvPr>
+            <p:ph type="pic" sz="quarter" idx="13"/>
+          </p:nvPr>
+        </p:nvSpPr>
+        <p:spPr>
+          <a:xfrm>
+            <a:off x="313593" y="4536078"/>
+            <a:ext cx="2143858" cy="529698"/>
+          </a:xfrm>
+          <a:prstGeom prst="rect">
+            <a:avLst/>
+          </a:prstGeom>
+        </p:spPr>
+        <p:txBody>
+          <a:bodyPr/>
+          <a:lstStyle/>
+          <a:p>
+            <a:endParaRPr lang="en-US" dirty="0"/>
+          </a:p>
+        </p:txBody>
+      </p:sp>
+      <p:sp>
+        <p:nvSpPr>
           <p:cNvPr id="3" name="Shape 1">
             <a:extLst>
               <a:ext uri="{FF2B5EF4-FFF2-40B4-BE49-F238E27FC236}">
@@ -782,39 +884,6 @@
               <a:rPr lang="en-US" dirty="0"/>
               <a:t>Slide Title</a:t>
             </a:r>
-          </a:p>
-        </p:txBody>
-      </p:sp>
-      <p:sp>
-        <p:nvSpPr>
-          <p:cNvPr id="12" name="Picture Placeholder 13">
-            <a:extLst>
-              <a:ext uri="{FF2B5EF4-FFF2-40B4-BE49-F238E27FC236}">
-                <a16:creationId xmlns:a16="http://schemas.microsoft.com/office/drawing/2014/main" id="{2DB97592-C4D5-B315-7F11-AA14F6EE8A62}"/>
-              </a:ext>
-            </a:extLst>
-          </p:cNvPr>
-          <p:cNvSpPr>
-            <a:spLocks noGrp="1"/>
-          </p:cNvSpPr>
-          <p:nvPr>
-            <p:ph type="pic" sz="quarter" idx="13"/>
-          </p:nvPr>
-        </p:nvSpPr>
-        <p:spPr>
-          <a:xfrm>
-            <a:off x="313593" y="4536078"/>
-            <a:ext cx="2143858" cy="529698"/>
-          </a:xfrm>
-          <a:prstGeom prst="rect">
-            <a:avLst/>
-          </a:prstGeom>
-        </p:spPr>
-        <p:txBody>
-          <a:bodyPr/>
-          <a:lstStyle/>
-          <a:p>
-            <a:endParaRPr lang="en-US" dirty="0"/>
           </a:p>
         </p:txBody>
       </p:sp>
@@ -971,6 +1040,39 @@
       </p:grpSpPr>
       <p:sp>
         <p:nvSpPr>
+          <p:cNvPr id="12" name="Picture Placeholder 13">
+            <a:extLst>
+              <a:ext uri="{FF2B5EF4-FFF2-40B4-BE49-F238E27FC236}">
+                <a16:creationId xmlns:a16="http://schemas.microsoft.com/office/drawing/2014/main" id="{2DB97592-C4D5-B315-7F11-AA14F6EE8A62}"/>
+              </a:ext>
+            </a:extLst>
+          </p:cNvPr>
+          <p:cNvSpPr>
+            <a:spLocks noGrp="1"/>
+          </p:cNvSpPr>
+          <p:nvPr>
+            <p:ph type="pic" sz="quarter" idx="13"/>
+          </p:nvPr>
+        </p:nvSpPr>
+        <p:spPr>
+          <a:xfrm>
+            <a:off x="313593" y="4536078"/>
+            <a:ext cx="2143858" cy="529698"/>
+          </a:xfrm>
+          <a:prstGeom prst="rect">
+            <a:avLst/>
+          </a:prstGeom>
+        </p:spPr>
+        <p:txBody>
+          <a:bodyPr/>
+          <a:lstStyle/>
+          <a:p>
+            <a:endParaRPr lang="en-US" dirty="0"/>
+          </a:p>
+        </p:txBody>
+      </p:sp>
+      <p:sp>
+        <p:nvSpPr>
           <p:cNvPr id="3" name="Shape 1">
             <a:extLst>
               <a:ext uri="{FF2B5EF4-FFF2-40B4-BE49-F238E27FC236}">
@@ -1060,39 +1162,6 @@
               <a:rPr lang="en-US" dirty="0"/>
               <a:t>Bullet Points</a:t>
             </a:r>
-          </a:p>
-        </p:txBody>
-      </p:sp>
-      <p:sp>
-        <p:nvSpPr>
-          <p:cNvPr id="12" name="Picture Placeholder 13">
-            <a:extLst>
-              <a:ext uri="{FF2B5EF4-FFF2-40B4-BE49-F238E27FC236}">
-                <a16:creationId xmlns:a16="http://schemas.microsoft.com/office/drawing/2014/main" id="{2DB97592-C4D5-B315-7F11-AA14F6EE8A62}"/>
-              </a:ext>
-            </a:extLst>
-          </p:cNvPr>
-          <p:cNvSpPr>
-            <a:spLocks noGrp="1"/>
-          </p:cNvSpPr>
-          <p:nvPr>
-            <p:ph type="pic" sz="quarter" idx="13"/>
-          </p:nvPr>
-        </p:nvSpPr>
-        <p:spPr>
-          <a:xfrm>
-            <a:off x="313593" y="4536078"/>
-            <a:ext cx="2143858" cy="529698"/>
-          </a:xfrm>
-          <a:prstGeom prst="rect">
-            <a:avLst/>
-          </a:prstGeom>
-        </p:spPr>
-        <p:txBody>
-          <a:bodyPr/>
-          <a:lstStyle/>
-          <a:p>
-            <a:endParaRPr lang="en-US" dirty="0"/>
           </a:p>
         </p:txBody>
       </p:sp>
@@ -1235,6 +1304,39 @@
       </p:grpSpPr>
       <p:sp>
         <p:nvSpPr>
+          <p:cNvPr id="10" name="Picture Placeholder 13">
+            <a:extLst>
+              <a:ext uri="{FF2B5EF4-FFF2-40B4-BE49-F238E27FC236}">
+                <a16:creationId xmlns:a16="http://schemas.microsoft.com/office/drawing/2014/main" id="{6A0FA445-7602-F06E-EC73-5504EBF827CC}"/>
+              </a:ext>
+            </a:extLst>
+          </p:cNvPr>
+          <p:cNvSpPr>
+            <a:spLocks noGrp="1"/>
+          </p:cNvSpPr>
+          <p:nvPr>
+            <p:ph type="pic" sz="quarter" idx="14"/>
+          </p:nvPr>
+        </p:nvSpPr>
+        <p:spPr>
+          <a:xfrm>
+            <a:off x="313592" y="4536078"/>
+            <a:ext cx="2121877" cy="529698"/>
+          </a:xfrm>
+          <a:prstGeom prst="rect">
+            <a:avLst/>
+          </a:prstGeom>
+        </p:spPr>
+        <p:txBody>
+          <a:bodyPr/>
+          <a:lstStyle/>
+          <a:p>
+            <a:endParaRPr lang="en-US" dirty="0"/>
+          </a:p>
+        </p:txBody>
+      </p:sp>
+      <p:sp>
+        <p:nvSpPr>
           <p:cNvPr id="3" name="Shape 1">
             <a:extLst>
               <a:ext uri="{FF2B5EF4-FFF2-40B4-BE49-F238E27FC236}">
@@ -1324,39 +1426,6 @@
               <a:rPr lang="en-US" dirty="0"/>
               <a:t>Two Column Layout</a:t>
             </a:r>
-          </a:p>
-        </p:txBody>
-      </p:sp>
-      <p:sp>
-        <p:nvSpPr>
-          <p:cNvPr id="10" name="Picture Placeholder 13">
-            <a:extLst>
-              <a:ext uri="{FF2B5EF4-FFF2-40B4-BE49-F238E27FC236}">
-                <a16:creationId xmlns:a16="http://schemas.microsoft.com/office/drawing/2014/main" id="{6A0FA445-7602-F06E-EC73-5504EBF827CC}"/>
-              </a:ext>
-            </a:extLst>
-          </p:cNvPr>
-          <p:cNvSpPr>
-            <a:spLocks noGrp="1"/>
-          </p:cNvSpPr>
-          <p:nvPr>
-            <p:ph type="pic" sz="quarter" idx="14"/>
-          </p:nvPr>
-        </p:nvSpPr>
-        <p:spPr>
-          <a:xfrm>
-            <a:off x="313592" y="4536078"/>
-            <a:ext cx="2121877" cy="529698"/>
-          </a:xfrm>
-          <a:prstGeom prst="rect">
-            <a:avLst/>
-          </a:prstGeom>
-        </p:spPr>
-        <p:txBody>
-          <a:bodyPr/>
-          <a:lstStyle/>
-          <a:p>
-            <a:endParaRPr lang="en-US" dirty="0"/>
           </a:p>
         </p:txBody>
       </p:sp>
@@ -1604,6 +1673,39 @@
       </p:grpSpPr>
       <p:sp>
         <p:nvSpPr>
+          <p:cNvPr id="12" name="Picture Placeholder 13">
+            <a:extLst>
+              <a:ext uri="{FF2B5EF4-FFF2-40B4-BE49-F238E27FC236}">
+                <a16:creationId xmlns:a16="http://schemas.microsoft.com/office/drawing/2014/main" id="{2DB97592-C4D5-B315-7F11-AA14F6EE8A62}"/>
+              </a:ext>
+            </a:extLst>
+          </p:cNvPr>
+          <p:cNvSpPr>
+            <a:spLocks noGrp="1"/>
+          </p:cNvSpPr>
+          <p:nvPr>
+            <p:ph type="pic" sz="quarter" idx="13"/>
+          </p:nvPr>
+        </p:nvSpPr>
+        <p:spPr>
+          <a:xfrm>
+            <a:off x="313592" y="4536078"/>
+            <a:ext cx="2126273" cy="529698"/>
+          </a:xfrm>
+          <a:prstGeom prst="rect">
+            <a:avLst/>
+          </a:prstGeom>
+        </p:spPr>
+        <p:txBody>
+          <a:bodyPr/>
+          <a:lstStyle/>
+          <a:p>
+            <a:endParaRPr lang="en-US" dirty="0"/>
+          </a:p>
+        </p:txBody>
+      </p:sp>
+      <p:sp>
+        <p:nvSpPr>
           <p:cNvPr id="3" name="Shape 1">
             <a:extLst>
               <a:ext uri="{FF2B5EF4-FFF2-40B4-BE49-F238E27FC236}">
@@ -1719,39 +1821,6 @@
           </a:p>
           <a:p>
             <a:pPr lvl="0"/>
-            <a:endParaRPr lang="en-US" dirty="0"/>
-          </a:p>
-        </p:txBody>
-      </p:sp>
-      <p:sp>
-        <p:nvSpPr>
-          <p:cNvPr id="12" name="Picture Placeholder 13">
-            <a:extLst>
-              <a:ext uri="{FF2B5EF4-FFF2-40B4-BE49-F238E27FC236}">
-                <a16:creationId xmlns:a16="http://schemas.microsoft.com/office/drawing/2014/main" id="{2DB97592-C4D5-B315-7F11-AA14F6EE8A62}"/>
-              </a:ext>
-            </a:extLst>
-          </p:cNvPr>
-          <p:cNvSpPr>
-            <a:spLocks noGrp="1"/>
-          </p:cNvSpPr>
-          <p:nvPr>
-            <p:ph type="pic" sz="quarter" idx="13"/>
-          </p:nvPr>
-        </p:nvSpPr>
-        <p:spPr>
-          <a:xfrm>
-            <a:off x="313592" y="4536078"/>
-            <a:ext cx="2126273" cy="529698"/>
-          </a:xfrm>
-          <a:prstGeom prst="rect">
-            <a:avLst/>
-          </a:prstGeom>
-        </p:spPr>
-        <p:txBody>
-          <a:bodyPr/>
-          <a:lstStyle/>
-          <a:p>
             <a:endParaRPr lang="en-US" dirty="0"/>
           </a:p>
         </p:txBody>
@@ -1863,6 +1932,39 @@
       </p:grpSpPr>
       <p:sp>
         <p:nvSpPr>
+          <p:cNvPr id="10" name="Picture Placeholder 13">
+            <a:extLst>
+              <a:ext uri="{FF2B5EF4-FFF2-40B4-BE49-F238E27FC236}">
+                <a16:creationId xmlns:a16="http://schemas.microsoft.com/office/drawing/2014/main" id="{6A0FA445-7602-F06E-EC73-5504EBF827CC}"/>
+              </a:ext>
+            </a:extLst>
+          </p:cNvPr>
+          <p:cNvSpPr>
+            <a:spLocks noGrp="1"/>
+          </p:cNvSpPr>
+          <p:nvPr>
+            <p:ph type="pic" sz="quarter" idx="14"/>
+          </p:nvPr>
+        </p:nvSpPr>
+        <p:spPr>
+          <a:xfrm>
+            <a:off x="313592" y="4536078"/>
+            <a:ext cx="2130670" cy="529698"/>
+          </a:xfrm>
+          <a:prstGeom prst="rect">
+            <a:avLst/>
+          </a:prstGeom>
+        </p:spPr>
+        <p:txBody>
+          <a:bodyPr/>
+          <a:lstStyle/>
+          <a:p>
+            <a:endParaRPr lang="en-US" dirty="0"/>
+          </a:p>
+        </p:txBody>
+      </p:sp>
+      <p:sp>
+        <p:nvSpPr>
           <p:cNvPr id="3" name="Shape 1">
             <a:extLst>
               <a:ext uri="{FF2B5EF4-FFF2-40B4-BE49-F238E27FC236}">
@@ -1952,39 +2054,6 @@
               <a:rPr lang="en-US" dirty="0"/>
               <a:t>Visual Content</a:t>
             </a:r>
-          </a:p>
-        </p:txBody>
-      </p:sp>
-      <p:sp>
-        <p:nvSpPr>
-          <p:cNvPr id="10" name="Picture Placeholder 13">
-            <a:extLst>
-              <a:ext uri="{FF2B5EF4-FFF2-40B4-BE49-F238E27FC236}">
-                <a16:creationId xmlns:a16="http://schemas.microsoft.com/office/drawing/2014/main" id="{6A0FA445-7602-F06E-EC73-5504EBF827CC}"/>
-              </a:ext>
-            </a:extLst>
-          </p:cNvPr>
-          <p:cNvSpPr>
-            <a:spLocks noGrp="1"/>
-          </p:cNvSpPr>
-          <p:nvPr>
-            <p:ph type="pic" sz="quarter" idx="14"/>
-          </p:nvPr>
-        </p:nvSpPr>
-        <p:spPr>
-          <a:xfrm>
-            <a:off x="313592" y="4536078"/>
-            <a:ext cx="2130670" cy="529698"/>
-          </a:xfrm>
-          <a:prstGeom prst="rect">
-            <a:avLst/>
-          </a:prstGeom>
-        </p:spPr>
-        <p:txBody>
-          <a:bodyPr/>
-          <a:lstStyle/>
-          <a:p>
-            <a:endParaRPr lang="en-US" dirty="0"/>
           </a:p>
         </p:txBody>
       </p:sp>
@@ -2180,6 +2249,39 @@
       </p:grpSpPr>
       <p:sp>
         <p:nvSpPr>
+          <p:cNvPr id="10" name="Picture Placeholder 13">
+            <a:extLst>
+              <a:ext uri="{FF2B5EF4-FFF2-40B4-BE49-F238E27FC236}">
+                <a16:creationId xmlns:a16="http://schemas.microsoft.com/office/drawing/2014/main" id="{6A0FA445-7602-F06E-EC73-5504EBF827CC}"/>
+              </a:ext>
+            </a:extLst>
+          </p:cNvPr>
+          <p:cNvSpPr>
+            <a:spLocks noGrp="1"/>
+          </p:cNvSpPr>
+          <p:nvPr>
+            <p:ph type="pic" sz="quarter" idx="14"/>
+          </p:nvPr>
+        </p:nvSpPr>
+        <p:spPr>
+          <a:xfrm>
+            <a:off x="313592" y="4536078"/>
+            <a:ext cx="2104294" cy="529698"/>
+          </a:xfrm>
+          <a:prstGeom prst="rect">
+            <a:avLst/>
+          </a:prstGeom>
+        </p:spPr>
+        <p:txBody>
+          <a:bodyPr/>
+          <a:lstStyle/>
+          <a:p>
+            <a:endParaRPr lang="en-US" dirty="0"/>
+          </a:p>
+        </p:txBody>
+      </p:sp>
+      <p:sp>
+        <p:nvSpPr>
           <p:cNvPr id="3" name="Shape 1">
             <a:extLst>
               <a:ext uri="{FF2B5EF4-FFF2-40B4-BE49-F238E27FC236}">
@@ -2269,39 +2371,6 @@
               <a:rPr lang="en-US" dirty="0"/>
               <a:t>Data Visualization</a:t>
             </a:r>
-          </a:p>
-        </p:txBody>
-      </p:sp>
-      <p:sp>
-        <p:nvSpPr>
-          <p:cNvPr id="10" name="Picture Placeholder 13">
-            <a:extLst>
-              <a:ext uri="{FF2B5EF4-FFF2-40B4-BE49-F238E27FC236}">
-                <a16:creationId xmlns:a16="http://schemas.microsoft.com/office/drawing/2014/main" id="{6A0FA445-7602-F06E-EC73-5504EBF827CC}"/>
-              </a:ext>
-            </a:extLst>
-          </p:cNvPr>
-          <p:cNvSpPr>
-            <a:spLocks noGrp="1"/>
-          </p:cNvSpPr>
-          <p:nvPr>
-            <p:ph type="pic" sz="quarter" idx="14"/>
-          </p:nvPr>
-        </p:nvSpPr>
-        <p:spPr>
-          <a:xfrm>
-            <a:off x="313592" y="4536078"/>
-            <a:ext cx="2104294" cy="529698"/>
-          </a:xfrm>
-          <a:prstGeom prst="rect">
-            <a:avLst/>
-          </a:prstGeom>
-        </p:spPr>
-        <p:txBody>
-          <a:bodyPr/>
-          <a:lstStyle/>
-          <a:p>
-            <a:endParaRPr lang="en-US" dirty="0"/>
           </a:p>
         </p:txBody>
       </p:sp>
@@ -3423,7 +3492,7 @@
       <p:grpSpPr/>
       <p:sp>
         <p:nvSpPr>
-          <p:cNvPr id="2" name="Text Placeholder 1"/>
+          <p:cNvPr id="3" name="Text Placeholder 2"/>
           <p:cNvSpPr>
             <a:spLocks noGrp="1"/>
           </p:cNvSpPr>
@@ -3727,7 +3796,7 @@
       <p:grpSpPr/>
       <p:sp>
         <p:nvSpPr>
-          <p:cNvPr id="2" name="Text Placeholder 1"/>
+          <p:cNvPr id="3" name="Text Placeholder 2"/>
           <p:cNvSpPr>
             <a:spLocks noGrp="1"/>
           </p:cNvSpPr>
@@ -3902,7 +3971,7 @@
       <p:grpSpPr/>
       <p:sp>
         <p:nvSpPr>
-          <p:cNvPr id="2" name="Text Placeholder 1"/>
+          <p:cNvPr id="3" name="Text Placeholder 2"/>
           <p:cNvSpPr>
             <a:spLocks noGrp="1"/>
           </p:cNvSpPr>
@@ -3934,7 +4003,7 @@
         </p:nvGraphicFramePr>
         <p:xfrm>
           <a:off x="256855" y="677011"/>
-          <a:ext cx="8710929" cy="370840"/>
+          <a:ext cx="8710929" cy="3337560"/>
         </p:xfrm>
         <a:graphic>
           <a:graphicData uri="http://schemas.openxmlformats.org/drawingml/2006/table">
@@ -4047,6 +4116,662 @@
                   </a:tcPr>
                 </a:tc>
               </a:tr>
+              <a:tr h="370840">
+                <a:tc>
+                  <a:txBody>
+                    <a:bodyPr/>
+                    <a:lstStyle/>
+                    <a:p>
+                      <a:r>
+                        <a:rPr b="1" sz="1100"/>
+                        <a:t>CMMC Level</a:t>
+                      </a:r>
+                    </a:p>
+                  </a:txBody>
+                  <a:tcPr>
+                    <a:solidFill>
+                      <a:srgbClr val="E7E6E6"/>
+                    </a:solidFill>
+                  </a:tcPr>
+                </a:tc>
+                <a:tc>
+                  <a:txBody>
+                    <a:bodyPr/>
+                    <a:lstStyle/>
+                    <a:p>
+                      <a:r>
+                        <a:rPr sz="1100"/>
+                        <a:t>Level 2 (Advanced Cyber Hygiene)</a:t>
+                      </a:r>
+                    </a:p>
+                  </a:txBody>
+                  <a:tcPr>
+                    <a:solidFill>
+                      <a:srgbClr val="E7E6E6"/>
+                    </a:solidFill>
+                  </a:tcPr>
+                </a:tc>
+                <a:tc>
+                  <a:txBody>
+                    <a:bodyPr/>
+                    <a:lstStyle/>
+                    <a:p/>
+                  </a:txBody>
+                  <a:tcPr>
+                    <a:solidFill>
+                      <a:srgbClr val="FFFFFF"/>
+                    </a:solidFill>
+                  </a:tcPr>
+                </a:tc>
+                <a:tc>
+                  <a:txBody>
+                    <a:bodyPr/>
+                    <a:lstStyle/>
+                    <a:p>
+                      <a:r>
+                        <a:rPr b="1" sz="1100"/>
+                        <a:t>Sentinel Capacity</a:t>
+                      </a:r>
+                    </a:p>
+                  </a:txBody>
+                  <a:tcPr>
+                    <a:solidFill>
+                      <a:srgbClr val="E7E6E6"/>
+                    </a:solidFill>
+                  </a:tcPr>
+                </a:tc>
+                <a:tc>
+                  <a:txBody>
+                    <a:bodyPr/>
+                    <a:lstStyle/>
+                    <a:p>
+                      <a:r>
+                        <a:rPr sz="1100"/>
+                        <a:t>100GB/month log ingestion</a:t>
+                      </a:r>
+                    </a:p>
+                  </a:txBody>
+                  <a:tcPr>
+                    <a:solidFill>
+                      <a:srgbClr val="E7E6E6"/>
+                    </a:solidFill>
+                  </a:tcPr>
+                </a:tc>
+              </a:tr>
+              <a:tr h="370840">
+                <a:tc>
+                  <a:txBody>
+                    <a:bodyPr/>
+                    <a:lstStyle/>
+                    <a:p>
+                      <a:r>
+                        <a:rPr b="1" sz="1100"/>
+                        <a:t>NIST 800-171 Controls</a:t>
+                      </a:r>
+                    </a:p>
+                  </a:txBody>
+                  <a:tcPr>
+                    <a:solidFill>
+                      <a:srgbClr val="E7E6E6"/>
+                    </a:solidFill>
+                  </a:tcPr>
+                </a:tc>
+                <a:tc>
+                  <a:txBody>
+                    <a:bodyPr/>
+                    <a:lstStyle/>
+                    <a:p>
+                      <a:r>
+                        <a:rPr sz="1100"/>
+                        <a:t>110 security requirements</a:t>
+                      </a:r>
+                    </a:p>
+                  </a:txBody>
+                  <a:tcPr>
+                    <a:solidFill>
+                      <a:srgbClr val="E7E6E6"/>
+                    </a:solidFill>
+                  </a:tcPr>
+                </a:tc>
+                <a:tc>
+                  <a:txBody>
+                    <a:bodyPr/>
+                    <a:lstStyle/>
+                    <a:p/>
+                  </a:txBody>
+                  <a:tcPr>
+                    <a:solidFill>
+                      <a:srgbClr val="FFFFFF"/>
+                    </a:solidFill>
+                  </a:tcPr>
+                </a:tc>
+                <a:tc>
+                  <a:txBody>
+                    <a:bodyPr/>
+                    <a:lstStyle/>
+                    <a:p>
+                      <a:r>
+                        <a:rPr b="1" sz="1100"/>
+                        <a:t>Defender Coverage</a:t>
+                      </a:r>
+                    </a:p>
+                  </a:txBody>
+                  <a:tcPr>
+                    <a:solidFill>
+                      <a:srgbClr val="E7E6E6"/>
+                    </a:solidFill>
+                  </a:tcPr>
+                </a:tc>
+                <a:tc>
+                  <a:txBody>
+                    <a:bodyPr/>
+                    <a:lstStyle/>
+                    <a:p>
+                      <a:r>
+                        <a:rPr sz="1100"/>
+                        <a:t>All Azure resources and M365 workloads</a:t>
+                      </a:r>
+                    </a:p>
+                  </a:txBody>
+                  <a:tcPr>
+                    <a:solidFill>
+                      <a:srgbClr val="E7E6E6"/>
+                    </a:solidFill>
+                  </a:tcPr>
+                </a:tc>
+              </a:tr>
+              <a:tr h="370840">
+                <a:tc>
+                  <a:txBody>
+                    <a:bodyPr/>
+                    <a:lstStyle/>
+                    <a:p>
+                      <a:r>
+                        <a:rPr b="1" sz="1100"/>
+                        <a:t>CUI User Count</a:t>
+                      </a:r>
+                    </a:p>
+                  </a:txBody>
+                  <a:tcPr>
+                    <a:solidFill>
+                      <a:srgbClr val="E7E6E6"/>
+                    </a:solidFill>
+                  </a:tcPr>
+                </a:tc>
+                <a:tc>
+                  <a:txBody>
+                    <a:bodyPr/>
+                    <a:lstStyle/>
+                    <a:p>
+                      <a:r>
+                        <a:rPr sz="1100"/>
+                        <a:t>50 users accessing CUI</a:t>
+                      </a:r>
+                    </a:p>
+                  </a:txBody>
+                  <a:tcPr>
+                    <a:solidFill>
+                      <a:srgbClr val="E7E6E6"/>
+                    </a:solidFill>
+                  </a:tcPr>
+                </a:tc>
+                <a:tc>
+                  <a:txBody>
+                    <a:bodyPr/>
+                    <a:lstStyle/>
+                    <a:p/>
+                  </a:txBody>
+                  <a:tcPr>
+                    <a:solidFill>
+                      <a:srgbClr val="FFFFFF"/>
+                    </a:solidFill>
+                  </a:tcPr>
+                </a:tc>
+                <a:tc>
+                  <a:txBody>
+                    <a:bodyPr/>
+                    <a:lstStyle/>
+                    <a:p>
+                      <a:r>
+                        <a:rPr b="1" sz="1100"/>
+                        <a:t>Authentication</a:t>
+                      </a:r>
+                    </a:p>
+                  </a:txBody>
+                  <a:tcPr>
+                    <a:solidFill>
+                      <a:srgbClr val="E7E6E6"/>
+                    </a:solidFill>
+                  </a:tcPr>
+                </a:tc>
+                <a:tc>
+                  <a:txBody>
+                    <a:bodyPr/>
+                    <a:lstStyle/>
+                    <a:p>
+                      <a:r>
+                        <a:rPr sz="1100"/>
+                        <a:t>CAC/PIV smart card with MFA</a:t>
+                      </a:r>
+                    </a:p>
+                  </a:txBody>
+                  <a:tcPr>
+                    <a:solidFill>
+                      <a:srgbClr val="E7E6E6"/>
+                    </a:solidFill>
+                  </a:tcPr>
+                </a:tc>
+              </a:tr>
+              <a:tr h="370840">
+                <a:tc>
+                  <a:txBody>
+                    <a:bodyPr/>
+                    <a:lstStyle/>
+                    <a:p>
+                      <a:r>
+                        <a:rPr b="1" sz="1100"/>
+                        <a:t>User Roles</a:t>
+                      </a:r>
+                    </a:p>
+                  </a:txBody>
+                  <a:tcPr>
+                    <a:solidFill>
+                      <a:srgbClr val="E7E6E6"/>
+                    </a:solidFill>
+                  </a:tcPr>
+                </a:tc>
+                <a:tc>
+                  <a:txBody>
+                    <a:bodyPr/>
+                    <a:lstStyle/>
+                    <a:p>
+                      <a:r>
+                        <a:rPr sz="1100"/>
+                        <a:t>3 roles (CUI processor admin reviewer)</a:t>
+                      </a:r>
+                    </a:p>
+                  </a:txBody>
+                  <a:tcPr>
+                    <a:solidFill>
+                      <a:srgbClr val="E7E6E6"/>
+                    </a:solidFill>
+                  </a:tcPr>
+                </a:tc>
+                <a:tc>
+                  <a:txBody>
+                    <a:bodyPr/>
+                    <a:lstStyle/>
+                    <a:p/>
+                  </a:txBody>
+                  <a:tcPr>
+                    <a:solidFill>
+                      <a:srgbClr val="FFFFFF"/>
+                    </a:solidFill>
+                  </a:tcPr>
+                </a:tc>
+                <a:tc>
+                  <a:txBody>
+                    <a:bodyPr/>
+                    <a:lstStyle/>
+                    <a:p>
+                      <a:r>
+                        <a:rPr b="1" sz="1100"/>
+                        <a:t>Identity Platform</a:t>
+                      </a:r>
+                    </a:p>
+                  </a:txBody>
+                  <a:tcPr>
+                    <a:solidFill>
+                      <a:srgbClr val="E7E6E6"/>
+                    </a:solidFill>
+                  </a:tcPr>
+                </a:tc>
+                <a:tc>
+                  <a:txBody>
+                    <a:bodyPr/>
+                    <a:lstStyle/>
+                    <a:p>
+                      <a:r>
+                        <a:rPr sz="1100"/>
+                        <a:t>Azure AD GCC High with SSO</a:t>
+                      </a:r>
+                    </a:p>
+                  </a:txBody>
+                  <a:tcPr>
+                    <a:solidFill>
+                      <a:srgbClr val="E7E6E6"/>
+                    </a:solidFill>
+                  </a:tcPr>
+                </a:tc>
+              </a:tr>
+              <a:tr h="370840">
+                <a:tc>
+                  <a:txBody>
+                    <a:bodyPr/>
+                    <a:lstStyle/>
+                    <a:p>
+                      <a:r>
+                        <a:rPr b="1" sz="1100"/>
+                        <a:t>M365 Tenant</a:t>
+                      </a:r>
+                    </a:p>
+                  </a:txBody>
+                  <a:tcPr>
+                    <a:solidFill>
+                      <a:srgbClr val="E7E6E6"/>
+                    </a:solidFill>
+                  </a:tcPr>
+                </a:tc>
+                <a:tc>
+                  <a:txBody>
+                    <a:bodyPr/>
+                    <a:lstStyle/>
+                    <a:p>
+                      <a:r>
+                        <a:rPr sz="1100"/>
+                        <a:t>GCC High (FedRAMP High)</a:t>
+                      </a:r>
+                    </a:p>
+                  </a:txBody>
+                  <a:tcPr>
+                    <a:solidFill>
+                      <a:srgbClr val="E7E6E6"/>
+                    </a:solidFill>
+                  </a:tcPr>
+                </a:tc>
+                <a:tc>
+                  <a:txBody>
+                    <a:bodyPr/>
+                    <a:lstStyle/>
+                    <a:p/>
+                  </a:txBody>
+                  <a:tcPr>
+                    <a:solidFill>
+                      <a:srgbClr val="FFFFFF"/>
+                    </a:solidFill>
+                  </a:tcPr>
+                </a:tc>
+                <a:tc>
+                  <a:txBody>
+                    <a:bodyPr/>
+                    <a:lstStyle/>
+                    <a:p>
+                      <a:r>
+                        <a:rPr b="1" sz="1100"/>
+                        <a:t>Data Encryption</a:t>
+                      </a:r>
+                    </a:p>
+                  </a:txBody>
+                  <a:tcPr>
+                    <a:solidFill>
+                      <a:srgbClr val="E7E6E6"/>
+                    </a:solidFill>
+                  </a:tcPr>
+                </a:tc>
+                <a:tc>
+                  <a:txBody>
+                    <a:bodyPr/>
+                    <a:lstStyle/>
+                    <a:p>
+                      <a:r>
+                        <a:rPr sz="1100"/>
+                        <a:t>FIPS 140-2 encryption at rest and transit</a:t>
+                      </a:r>
+                    </a:p>
+                  </a:txBody>
+                  <a:tcPr>
+                    <a:solidFill>
+                      <a:srgbClr val="E7E6E6"/>
+                    </a:solidFill>
+                  </a:tcPr>
+                </a:tc>
+              </a:tr>
+              <a:tr h="370840">
+                <a:tc>
+                  <a:txBody>
+                    <a:bodyPr/>
+                    <a:lstStyle/>
+                    <a:p>
+                      <a:r>
+                        <a:rPr b="1" sz="1100"/>
+                        <a:t>M365 Services</a:t>
+                      </a:r>
+                    </a:p>
+                  </a:txBody>
+                  <a:tcPr>
+                    <a:solidFill>
+                      <a:srgbClr val="E7E6E6"/>
+                    </a:solidFill>
+                  </a:tcPr>
+                </a:tc>
+                <a:tc>
+                  <a:txBody>
+                    <a:bodyPr/>
+                    <a:lstStyle/>
+                    <a:p>
+                      <a:r>
+                        <a:rPr sz="1100"/>
+                        <a:t>Exchange SharePoint Teams OneDrive Purview</a:t>
+                      </a:r>
+                    </a:p>
+                  </a:txBody>
+                  <a:tcPr>
+                    <a:solidFill>
+                      <a:srgbClr val="E7E6E6"/>
+                    </a:solidFill>
+                  </a:tcPr>
+                </a:tc>
+                <a:tc>
+                  <a:txBody>
+                    <a:bodyPr/>
+                    <a:lstStyle/>
+                    <a:p/>
+                  </a:txBody>
+                  <a:tcPr>
+                    <a:solidFill>
+                      <a:srgbClr val="FFFFFF"/>
+                    </a:solidFill>
+                  </a:tcPr>
+                </a:tc>
+                <a:tc>
+                  <a:txBody>
+                    <a:bodyPr/>
+                    <a:lstStyle/>
+                    <a:p>
+                      <a:r>
+                        <a:rPr b="1" sz="1100"/>
+                        <a:t>Availability Requirements</a:t>
+                      </a:r>
+                    </a:p>
+                  </a:txBody>
+                  <a:tcPr>
+                    <a:solidFill>
+                      <a:srgbClr val="E7E6E6"/>
+                    </a:solidFill>
+                  </a:tcPr>
+                </a:tc>
+                <a:tc>
+                  <a:txBody>
+                    <a:bodyPr/>
+                    <a:lstStyle/>
+                    <a:p>
+                      <a:r>
+                        <a:rPr sz="1100"/>
+                        <a:t>99.9% (GCC High SLA)</a:t>
+                      </a:r>
+                    </a:p>
+                  </a:txBody>
+                  <a:tcPr>
+                    <a:solidFill>
+                      <a:srgbClr val="E7E6E6"/>
+                    </a:solidFill>
+                  </a:tcPr>
+                </a:tc>
+              </a:tr>
+              <a:tr h="370840">
+                <a:tc>
+                  <a:txBody>
+                    <a:bodyPr/>
+                    <a:lstStyle/>
+                    <a:p>
+                      <a:r>
+                        <a:rPr b="1" sz="1100"/>
+                        <a:t>Email Migration Volume</a:t>
+                      </a:r>
+                    </a:p>
+                  </a:txBody>
+                  <a:tcPr>
+                    <a:solidFill>
+                      <a:srgbClr val="E7E6E6"/>
+                    </a:solidFill>
+                  </a:tcPr>
+                </a:tc>
+                <a:tc>
+                  <a:txBody>
+                    <a:bodyPr/>
+                    <a:lstStyle/>
+                    <a:p>
+                      <a:r>
+                        <a:rPr sz="1100"/>
+                        <a:t>100 GB total mailbox data</a:t>
+                      </a:r>
+                    </a:p>
+                  </a:txBody>
+                  <a:tcPr>
+                    <a:solidFill>
+                      <a:srgbClr val="E7E6E6"/>
+                    </a:solidFill>
+                  </a:tcPr>
+                </a:tc>
+                <a:tc>
+                  <a:txBody>
+                    <a:bodyPr/>
+                    <a:lstStyle/>
+                    <a:p/>
+                  </a:txBody>
+                  <a:tcPr>
+                    <a:solidFill>
+                      <a:srgbClr val="FFFFFF"/>
+                    </a:solidFill>
+                  </a:tcPr>
+                </a:tc>
+                <a:tc>
+                  <a:txBody>
+                    <a:bodyPr/>
+                    <a:lstStyle/>
+                    <a:p>
+                      <a:r>
+                        <a:rPr b="1" sz="1100"/>
+                        <a:t>Infrastructure Complexity</a:t>
+                      </a:r>
+                    </a:p>
+                  </a:txBody>
+                  <a:tcPr>
+                    <a:solidFill>
+                      <a:srgbClr val="E7E6E6"/>
+                    </a:solidFill>
+                  </a:tcPr>
+                </a:tc>
+                <a:tc>
+                  <a:txBody>
+                    <a:bodyPr/>
+                    <a:lstStyle/>
+                    <a:p>
+                      <a:r>
+                        <a:rPr sz="1100"/>
+                        <a:t>Azure Gov + M365 GCC High hybrid</a:t>
+                      </a:r>
+                    </a:p>
+                  </a:txBody>
+                  <a:tcPr>
+                    <a:solidFill>
+                      <a:srgbClr val="E7E6E6"/>
+                    </a:solidFill>
+                  </a:tcPr>
+                </a:tc>
+              </a:tr>
+              <a:tr h="370840">
+                <a:tc>
+                  <a:txBody>
+                    <a:bodyPr/>
+                    <a:lstStyle/>
+                    <a:p>
+                      <a:r>
+                        <a:rPr b="1" sz="1100"/>
+                        <a:t>File Migration Volume</a:t>
+                      </a:r>
+                    </a:p>
+                  </a:txBody>
+                  <a:tcPr>
+                    <a:solidFill>
+                      <a:srgbClr val="E7E6E6"/>
+                    </a:solidFill>
+                  </a:tcPr>
+                </a:tc>
+                <a:tc>
+                  <a:txBody>
+                    <a:bodyPr/>
+                    <a:lstStyle/>
+                    <a:p>
+                      <a:r>
+                        <a:rPr sz="1100"/>
+                        <a:t>500 GB SharePoint and OneDrive</a:t>
+                      </a:r>
+                    </a:p>
+                  </a:txBody>
+                  <a:tcPr>
+                    <a:solidFill>
+                      <a:srgbClr val="E7E6E6"/>
+                    </a:solidFill>
+                  </a:tcPr>
+                </a:tc>
+                <a:tc>
+                  <a:txBody>
+                    <a:bodyPr/>
+                    <a:lstStyle/>
+                    <a:p/>
+                  </a:txBody>
+                  <a:tcPr>
+                    <a:solidFill>
+                      <a:srgbClr val="FFFFFF"/>
+                    </a:solidFill>
+                  </a:tcPr>
+                </a:tc>
+                <a:tc>
+                  <a:txBody>
+                    <a:bodyPr/>
+                    <a:lstStyle/>
+                    <a:p>
+                      <a:r>
+                        <a:rPr b="1" sz="1100"/>
+                        <a:t>Deployment Regions</a:t>
+                      </a:r>
+                    </a:p>
+                  </a:txBody>
+                  <a:tcPr>
+                    <a:solidFill>
+                      <a:srgbClr val="E7E6E6"/>
+                    </a:solidFill>
+                  </a:tcPr>
+                </a:tc>
+                <a:tc>
+                  <a:txBody>
+                    <a:bodyPr/>
+                    <a:lstStyle/>
+                    <a:p>
+                      <a:r>
+                        <a:rPr sz="1100"/>
+                        <a:t>Single Azure Gov region (us-gov-virginia)</a:t>
+                      </a:r>
+                    </a:p>
+                  </a:txBody>
+                  <a:tcPr>
+                    <a:solidFill>
+                      <a:srgbClr val="E7E6E6"/>
+                    </a:solidFill>
+                  </a:tcPr>
+                </a:tc>
+              </a:tr>
             </a:tbl>
           </a:graphicData>
         </a:graphic>
@@ -4089,7 +4814,7 @@
           <p:nvPr/>
         </p:nvPicPr>
         <p:blipFill>
-          <a:blip r:embed="rId2"/>
+          <a:blip r:embed="rId3"/>
           <a:stretch>
             <a:fillRect/>
           </a:stretch>
@@ -4124,7 +4849,7 @@
       <p:grpSpPr/>
       <p:sp>
         <p:nvSpPr>
-          <p:cNvPr id="2" name="Text Placeholder 1"/>
+          <p:cNvPr id="3" name="Text Placeholder 2"/>
           <p:cNvSpPr>
             <a:spLocks noGrp="1"/>
           </p:cNvSpPr>
@@ -4313,7 +5038,7 @@
       <p:grpSpPr/>
       <p:sp>
         <p:nvSpPr>
-          <p:cNvPr id="2" name="Text Placeholder 1"/>
+          <p:cNvPr id="3" name="Text Placeholder 2"/>
           <p:cNvSpPr>
             <a:spLocks noGrp="1"/>
           </p:cNvSpPr>
@@ -4497,7 +5222,7 @@
       <p:grpSpPr/>
       <p:sp>
         <p:nvSpPr>
-          <p:cNvPr id="2" name="Text Placeholder 1"/>
+          <p:cNvPr id="3" name="Text Placeholder 2"/>
           <p:cNvSpPr>
             <a:spLocks noGrp="1"/>
           </p:cNvSpPr>
@@ -4916,7 +5641,7 @@
       <p:grpSpPr/>
       <p:sp>
         <p:nvSpPr>
-          <p:cNvPr id="2" name="Text Placeholder 1"/>
+          <p:cNvPr id="3" name="Text Placeholder 2"/>
           <p:cNvSpPr>
             <a:spLocks noGrp="1"/>
           </p:cNvSpPr>
@@ -5089,7 +5814,7 @@
       <p:grpSpPr/>
       <p:sp>
         <p:nvSpPr>
-          <p:cNvPr id="2" name="Text Placeholder 1"/>
+          <p:cNvPr id="3" name="Text Placeholder 2"/>
           <p:cNvSpPr>
             <a:spLocks noGrp="1"/>
           </p:cNvSpPr>
@@ -5276,7 +6001,7 @@
       <p:grpSpPr/>
       <p:sp>
         <p:nvSpPr>
-          <p:cNvPr id="2" name="Text Placeholder 1"/>
+          <p:cNvPr id="3" name="Text Placeholder 2"/>
           <p:cNvSpPr>
             <a:spLocks noGrp="1"/>
           </p:cNvSpPr>

</xml_diff>